<commit_message>
TB - relecture CM
</commit_message>
<xml_diff>
--- a/Sprint 8/Poster.pptx
+++ b/Sprint 8/Poster.pptx
@@ -260,7 +260,7 @@
               <a:pPr>
                 <a:defRPr/>
               </a:pPr>
-              <a:t>28.07.2020</a:t>
+              <a:t>04.08.2020</a:t>
             </a:fld>
             <a:endParaRPr lang="de-CH"/>
           </a:p>
@@ -1994,7 +1994,7 @@
                   <a:schemeClr val="tx1"/>
                 </a:solidFill>
               </a:rPr>
-              <a:t> est retenu comme étant l’API de détection de plagiat le plus efficace</a:t>
+              <a:t> est retenu comme étant l’API de détection de plagiat la plus efficace</a:t>
             </a:r>
           </a:p>
           <a:p>
@@ -2706,7 +2706,7 @@
               <a:rPr lang="en-US" sz="6000" b="1" dirty="0" err="1">
                 <a:latin typeface="+mn-lt"/>
               </a:rPr>
-              <a:t>Étudiant</a:t>
+              <a:t>Etudiant</a:t>
             </a:r>
             <a:r>
               <a:rPr lang="en-US" sz="6000" b="1" dirty="0">
@@ -2816,7 +2816,7 @@
                   <a:srgbClr val="0076B3"/>
                 </a:solidFill>
               </a:rPr>
-              <a:t>Création d’un label pour certifier l’originalité et la qualité d’un article de journal</a:t>
+              <a:t>Création d’un label afin de certifier l’originalité et la qualité d’un article de journal</a:t>
             </a:r>
           </a:p>
           <a:p>
@@ -2830,7 +2830,7 @@
                   <a:srgbClr val="0076B3"/>
                 </a:solidFill>
               </a:rPr>
-              <a:t>Détection automatique du taux de plagiat d’un texte en utilisant une API</a:t>
+              <a:t>Détection automatique du taux de plagiat d’un texte à l’aide d’une API</a:t>
             </a:r>
           </a:p>
           <a:p>
@@ -2844,7 +2844,7 @@
                   <a:srgbClr val="0076B3"/>
                 </a:solidFill>
               </a:rPr>
-              <a:t>Mise à disposition d’une interface web permettant aux journalistes de faire certifier leurs articles</a:t>
+              <a:t>Mise à disposition d’une interface web permettant aux journalistes de certifier leurs articles</a:t>
             </a:r>
             <a:endParaRPr lang="en-US" sz="4300" dirty="0">
               <a:solidFill>
@@ -2975,7 +2975,7 @@
                   <a:schemeClr val="tx1"/>
                 </a:solidFill>
               </a:rPr>
-              <a:t>Ce label vise à redonner confiance au lectorat en montrant que les articles sont réalisés en respectant plusieurs règles: indication des sources, contenu non plagié etc…</a:t>
+              <a:t>Ce label vise à redonner confiance au lectorat en garantissant que les articles sont réalisés en respectant plusieurs règles: indication des sources, contenu non plagié, etc…</a:t>
             </a:r>
           </a:p>
           <a:p>
@@ -3411,7 +3411,23 @@
                   <a:prstClr val="black"/>
                 </a:solidFill>
               </a:rPr>
-              <a:t>Le journaliste créé un article </a:t>
+              <a:t>Le </a:t>
+            </a:r>
+            <a:r>
+              <a:rPr lang="fr-CH" sz="3900">
+                <a:solidFill>
+                  <a:prstClr val="black"/>
+                </a:solidFill>
+              </a:rPr>
+              <a:t>journaliste crée </a:t>
+            </a:r>
+            <a:r>
+              <a:rPr lang="fr-CH" sz="3900" dirty="0">
+                <a:solidFill>
+                  <a:prstClr val="black"/>
+                </a:solidFill>
+              </a:rPr>
+              <a:t>un article </a:t>
             </a:r>
           </a:p>
           <a:p>

</xml_diff>